<commit_message>
- Graphics, documents update
git-svn-id: svn://gasbank.kaist.ac.kr/aran/trunk@80 62270530-ab42-0410-9ef6-e3964f34a1eb
</commit_message>
<xml_diff>
--- a/Doc/Object Hierarchy.pptx
+++ b/Doc/Object Hierarchy.pptx
@@ -291,7 +291,8 @@
           <a:p>
             <a:fld id="{7FF92507-4625-4F79-A931-D653D1326E1D}" type="datetimeFigureOut">
               <a:rPr lang="ko-KR" altLang="en-US" smtClean="0"/>
-              <a:t>2008-06-24</a:t>
+              <a:pPr/>
+              <a:t>2008-06-26</a:t>
             </a:fld>
             <a:endParaRPr lang="ko-KR" altLang="en-US"/>
           </a:p>
@@ -333,6 +334,7 @@
           <a:p>
             <a:fld id="{035CABDE-0FEC-4FBE-B9D2-8C60E4FF7693}" type="slidenum">
               <a:rPr lang="ko-KR" altLang="en-US" smtClean="0"/>
+              <a:pPr/>
               <a:t>‹#›</a:t>
             </a:fld>
             <a:endParaRPr lang="ko-KR" altLang="en-US"/>
@@ -456,7 +458,8 @@
           <a:p>
             <a:fld id="{7FF92507-4625-4F79-A931-D653D1326E1D}" type="datetimeFigureOut">
               <a:rPr lang="ko-KR" altLang="en-US" smtClean="0"/>
-              <a:t>2008-06-24</a:t>
+              <a:pPr/>
+              <a:t>2008-06-26</a:t>
             </a:fld>
             <a:endParaRPr lang="ko-KR" altLang="en-US"/>
           </a:p>
@@ -498,6 +501,7 @@
           <a:p>
             <a:fld id="{035CABDE-0FEC-4FBE-B9D2-8C60E4FF7693}" type="slidenum">
               <a:rPr lang="ko-KR" altLang="en-US" smtClean="0"/>
+              <a:pPr/>
               <a:t>‹#›</a:t>
             </a:fld>
             <a:endParaRPr lang="ko-KR" altLang="en-US"/>
@@ -631,7 +635,8 @@
           <a:p>
             <a:fld id="{7FF92507-4625-4F79-A931-D653D1326E1D}" type="datetimeFigureOut">
               <a:rPr lang="ko-KR" altLang="en-US" smtClean="0"/>
-              <a:t>2008-06-24</a:t>
+              <a:pPr/>
+              <a:t>2008-06-26</a:t>
             </a:fld>
             <a:endParaRPr lang="ko-KR" altLang="en-US"/>
           </a:p>
@@ -673,6 +678,7 @@
           <a:p>
             <a:fld id="{035CABDE-0FEC-4FBE-B9D2-8C60E4FF7693}" type="slidenum">
               <a:rPr lang="ko-KR" altLang="en-US" smtClean="0"/>
+              <a:pPr/>
               <a:t>‹#›</a:t>
             </a:fld>
             <a:endParaRPr lang="ko-KR" altLang="en-US"/>
@@ -796,7 +802,8 @@
           <a:p>
             <a:fld id="{7FF92507-4625-4F79-A931-D653D1326E1D}" type="datetimeFigureOut">
               <a:rPr lang="ko-KR" altLang="en-US" smtClean="0"/>
-              <a:t>2008-06-24</a:t>
+              <a:pPr/>
+              <a:t>2008-06-26</a:t>
             </a:fld>
             <a:endParaRPr lang="ko-KR" altLang="en-US"/>
           </a:p>
@@ -838,6 +845,7 @@
           <a:p>
             <a:fld id="{035CABDE-0FEC-4FBE-B9D2-8C60E4FF7693}" type="slidenum">
               <a:rPr lang="ko-KR" altLang="en-US" smtClean="0"/>
+              <a:pPr/>
               <a:t>‹#›</a:t>
             </a:fld>
             <a:endParaRPr lang="ko-KR" altLang="en-US"/>
@@ -1037,7 +1045,8 @@
           <a:p>
             <a:fld id="{7FF92507-4625-4F79-A931-D653D1326E1D}" type="datetimeFigureOut">
               <a:rPr lang="ko-KR" altLang="en-US" smtClean="0"/>
-              <a:t>2008-06-24</a:t>
+              <a:pPr/>
+              <a:t>2008-06-26</a:t>
             </a:fld>
             <a:endParaRPr lang="ko-KR" altLang="en-US"/>
           </a:p>
@@ -1079,6 +1088,7 @@
           <a:p>
             <a:fld id="{035CABDE-0FEC-4FBE-B9D2-8C60E4FF7693}" type="slidenum">
               <a:rPr lang="ko-KR" altLang="en-US" smtClean="0"/>
+              <a:pPr/>
               <a:t>‹#›</a:t>
             </a:fld>
             <a:endParaRPr lang="ko-KR" altLang="en-US"/>
@@ -1320,7 +1330,8 @@
           <a:p>
             <a:fld id="{7FF92507-4625-4F79-A931-D653D1326E1D}" type="datetimeFigureOut">
               <a:rPr lang="ko-KR" altLang="en-US" smtClean="0"/>
-              <a:t>2008-06-24</a:t>
+              <a:pPr/>
+              <a:t>2008-06-26</a:t>
             </a:fld>
             <a:endParaRPr lang="ko-KR" altLang="en-US"/>
           </a:p>
@@ -1362,6 +1373,7 @@
           <a:p>
             <a:fld id="{035CABDE-0FEC-4FBE-B9D2-8C60E4FF7693}" type="slidenum">
               <a:rPr lang="ko-KR" altLang="en-US" smtClean="0"/>
+              <a:pPr/>
               <a:t>‹#›</a:t>
             </a:fld>
             <a:endParaRPr lang="ko-KR" altLang="en-US"/>
@@ -1737,7 +1749,8 @@
           <a:p>
             <a:fld id="{7FF92507-4625-4F79-A931-D653D1326E1D}" type="datetimeFigureOut">
               <a:rPr lang="ko-KR" altLang="en-US" smtClean="0"/>
-              <a:t>2008-06-24</a:t>
+              <a:pPr/>
+              <a:t>2008-06-26</a:t>
             </a:fld>
             <a:endParaRPr lang="ko-KR" altLang="en-US"/>
           </a:p>
@@ -1779,6 +1792,7 @@
           <a:p>
             <a:fld id="{035CABDE-0FEC-4FBE-B9D2-8C60E4FF7693}" type="slidenum">
               <a:rPr lang="ko-KR" altLang="en-US" smtClean="0"/>
+              <a:pPr/>
               <a:t>‹#›</a:t>
             </a:fld>
             <a:endParaRPr lang="ko-KR" altLang="en-US"/>
@@ -1850,7 +1864,8 @@
           <a:p>
             <a:fld id="{7FF92507-4625-4F79-A931-D653D1326E1D}" type="datetimeFigureOut">
               <a:rPr lang="ko-KR" altLang="en-US" smtClean="0"/>
-              <a:t>2008-06-24</a:t>
+              <a:pPr/>
+              <a:t>2008-06-26</a:t>
             </a:fld>
             <a:endParaRPr lang="ko-KR" altLang="en-US"/>
           </a:p>
@@ -1892,6 +1907,7 @@
           <a:p>
             <a:fld id="{035CABDE-0FEC-4FBE-B9D2-8C60E4FF7693}" type="slidenum">
               <a:rPr lang="ko-KR" altLang="en-US" smtClean="0"/>
+              <a:pPr/>
               <a:t>‹#›</a:t>
             </a:fld>
             <a:endParaRPr lang="ko-KR" altLang="en-US"/>
@@ -1940,7 +1956,8 @@
           <a:p>
             <a:fld id="{7FF92507-4625-4F79-A931-D653D1326E1D}" type="datetimeFigureOut">
               <a:rPr lang="ko-KR" altLang="en-US" smtClean="0"/>
-              <a:t>2008-06-24</a:t>
+              <a:pPr/>
+              <a:t>2008-06-26</a:t>
             </a:fld>
             <a:endParaRPr lang="ko-KR" altLang="en-US"/>
           </a:p>
@@ -1982,6 +1999,7 @@
           <a:p>
             <a:fld id="{035CABDE-0FEC-4FBE-B9D2-8C60E4FF7693}" type="slidenum">
               <a:rPr lang="ko-KR" altLang="en-US" smtClean="0"/>
+              <a:pPr/>
               <a:t>‹#›</a:t>
             </a:fld>
             <a:endParaRPr lang="ko-KR" altLang="en-US"/>
@@ -2212,7 +2230,8 @@
           <a:p>
             <a:fld id="{7FF92507-4625-4F79-A931-D653D1326E1D}" type="datetimeFigureOut">
               <a:rPr lang="ko-KR" altLang="en-US" smtClean="0"/>
-              <a:t>2008-06-24</a:t>
+              <a:pPr/>
+              <a:t>2008-06-26</a:t>
             </a:fld>
             <a:endParaRPr lang="ko-KR" altLang="en-US"/>
           </a:p>
@@ -2254,6 +2273,7 @@
           <a:p>
             <a:fld id="{035CABDE-0FEC-4FBE-B9D2-8C60E4FF7693}" type="slidenum">
               <a:rPr lang="ko-KR" altLang="en-US" smtClean="0"/>
+              <a:pPr/>
               <a:t>‹#›</a:t>
             </a:fld>
             <a:endParaRPr lang="ko-KR" altLang="en-US"/>
@@ -2460,7 +2480,8 @@
           <a:p>
             <a:fld id="{7FF92507-4625-4F79-A931-D653D1326E1D}" type="datetimeFigureOut">
               <a:rPr lang="ko-KR" altLang="en-US" smtClean="0"/>
-              <a:t>2008-06-24</a:t>
+              <a:pPr/>
+              <a:t>2008-06-26</a:t>
             </a:fld>
             <a:endParaRPr lang="ko-KR" altLang="en-US"/>
           </a:p>
@@ -2502,6 +2523,7 @@
           <a:p>
             <a:fld id="{035CABDE-0FEC-4FBE-B9D2-8C60E4FF7693}" type="slidenum">
               <a:rPr lang="ko-KR" altLang="en-US" smtClean="0"/>
+              <a:pPr/>
               <a:t>‹#›</a:t>
             </a:fld>
             <a:endParaRPr lang="ko-KR" altLang="en-US"/>
@@ -2668,7 +2690,8 @@
           <a:p>
             <a:fld id="{7FF92507-4625-4F79-A931-D653D1326E1D}" type="datetimeFigureOut">
               <a:rPr lang="ko-KR" altLang="en-US" smtClean="0"/>
-              <a:t>2008-06-24</a:t>
+              <a:pPr/>
+              <a:t>2008-06-26</a:t>
             </a:fld>
             <a:endParaRPr lang="ko-KR" altLang="en-US"/>
           </a:p>
@@ -2746,6 +2769,7 @@
           <a:p>
             <a:fld id="{035CABDE-0FEC-4FBE-B9D2-8C60E4FF7693}" type="slidenum">
               <a:rPr lang="ko-KR" altLang="en-US" smtClean="0"/>
+              <a:pPr/>
               <a:t>‹#›</a:t>
             </a:fld>
             <a:endParaRPr lang="ko-KR" altLang="en-US"/>
@@ -3111,7 +3135,6 @@
               <a:rPr lang="ko-KR" altLang="en-US"/>
               <a:t>엽</a:t>
             </a:r>
-            <a:endParaRPr lang="ko-KR" altLang="en-US"/>
           </a:p>
         </p:txBody>
       </p:sp>
@@ -3176,8 +3199,8 @@
           <a:lstStyle/>
           <a:p>
             <a:r>
-              <a:rPr lang="en-US" altLang="ko-KR" sz="1200" err="1" smtClean="0"/>
-              <a:t>ArObject</a:t>
+              <a:rPr lang="en-US" altLang="ko-KR" sz="1200" smtClean="0"/>
+              <a:t>ArnObject</a:t>
             </a:r>
             <a:endParaRPr lang="ko-KR" altLang="en-US" sz="1200"/>
           </a:p>
@@ -3219,8 +3242,8 @@
           <a:lstStyle/>
           <a:p>
             <a:r>
-              <a:rPr lang="en-US" altLang="ko-KR" sz="1200" err="1" smtClean="0"/>
-              <a:t>ArNode</a:t>
+              <a:rPr lang="en-US" altLang="ko-KR" sz="1200" smtClean="0"/>
+              <a:t>ArnNode</a:t>
             </a:r>
             <a:endParaRPr lang="ko-KR" altLang="en-US" sz="1200"/>
           </a:p>
@@ -3235,7 +3258,7 @@
         <p:spPr>
           <a:xfrm>
             <a:off x="2667000" y="2133600"/>
-            <a:ext cx="914400" cy="276999"/>
+            <a:ext cx="1066800" cy="276999"/>
           </a:xfrm>
           <a:prstGeom prst="rect">
             <a:avLst/>
@@ -3262,8 +3285,8 @@
           <a:lstStyle/>
           <a:p>
             <a:r>
-              <a:rPr lang="en-US" altLang="ko-KR" sz="1200" err="1" smtClean="0"/>
-              <a:t>ArMaterial</a:t>
+              <a:rPr lang="en-US" altLang="ko-KR" sz="1200" smtClean="0"/>
+              <a:t>ArnMaterial</a:t>
             </a:r>
             <a:endParaRPr lang="ko-KR" altLang="en-US" sz="1200"/>
           </a:p>
@@ -3305,8 +3328,8 @@
           <a:lstStyle/>
           <a:p>
             <a:r>
-              <a:rPr lang="en-US" altLang="ko-KR" sz="1200" err="1" smtClean="0"/>
-              <a:t>ArMesh</a:t>
+              <a:rPr lang="en-US" altLang="ko-KR" sz="1200" smtClean="0"/>
+              <a:t>ArnMesh</a:t>
             </a:r>
             <a:endParaRPr lang="ko-KR" altLang="en-US" sz="1200"/>
           </a:p>
@@ -3314,14 +3337,14 @@
       </p:sp>
       <p:sp>
         <p:nvSpPr>
-          <p:cNvPr id="9" name="TextBox 8"/>
+          <p:cNvPr id="10" name="TextBox 9"/>
           <p:cNvSpPr txBox="1"/>
           <p:nvPr/>
         </p:nvSpPr>
         <p:spPr>
           <a:xfrm>
-            <a:off x="2667000" y="3048000"/>
-            <a:ext cx="914400" cy="276999"/>
+            <a:off x="3886200" y="1219200"/>
+            <a:ext cx="1066800" cy="276999"/>
           </a:xfrm>
           <a:prstGeom prst="rect">
             <a:avLst/>
@@ -3348,51 +3371,8 @@
           <a:lstStyle/>
           <a:p>
             <a:r>
-              <a:rPr lang="en-US" altLang="ko-KR" sz="1200" err="1" smtClean="0"/>
-              <a:t>ArFace</a:t>
-            </a:r>
-            <a:endParaRPr lang="ko-KR" altLang="en-US" sz="1200"/>
-          </a:p>
-        </p:txBody>
-      </p:sp>
-      <p:sp>
-        <p:nvSpPr>
-          <p:cNvPr id="10" name="TextBox 9"/>
-          <p:cNvSpPr txBox="1"/>
-          <p:nvPr/>
-        </p:nvSpPr>
-        <p:spPr>
-          <a:xfrm>
-            <a:off x="3886200" y="1219200"/>
-            <a:ext cx="914400" cy="276999"/>
-          </a:xfrm>
-          <a:prstGeom prst="rect">
-            <a:avLst/>
-          </a:prstGeom>
-        </p:spPr>
-        <p:style>
-          <a:lnRef idx="2">
-            <a:schemeClr val="accent3"/>
-          </a:lnRef>
-          <a:fillRef idx="1">
-            <a:schemeClr val="lt1"/>
-          </a:fillRef>
-          <a:effectRef idx="0">
-            <a:schemeClr val="accent3"/>
-          </a:effectRef>
-          <a:fontRef idx="minor">
-            <a:schemeClr val="dk1"/>
-          </a:fontRef>
-        </p:style>
-        <p:txBody>
-          <a:bodyPr wrap="square" rtlCol="0">
-            <a:spAutoFit/>
-          </a:bodyPr>
-          <a:lstStyle/>
-          <a:p>
-            <a:r>
-              <a:rPr lang="en-US" altLang="ko-KR" sz="1200" err="1" smtClean="0"/>
-              <a:t>ArCamera</a:t>
+              <a:rPr lang="en-US" altLang="ko-KR" sz="1200" smtClean="0"/>
+              <a:t>ArnCamera</a:t>
             </a:r>
             <a:endParaRPr lang="ko-KR" altLang="en-US" sz="1200"/>
           </a:p>
@@ -3434,8 +3414,8 @@
           <a:lstStyle/>
           <a:p>
             <a:r>
-              <a:rPr lang="en-US" altLang="ko-KR" sz="1200" err="1" smtClean="0"/>
-              <a:t>ArLight</a:t>
+              <a:rPr lang="en-US" altLang="ko-KR" sz="1200" smtClean="0"/>
+              <a:t>ArnLight</a:t>
             </a:r>
             <a:endParaRPr lang="ko-KR" altLang="en-US" sz="1200"/>
           </a:p>
@@ -3449,7 +3429,7 @@
         </p:nvSpPr>
         <p:spPr>
           <a:xfrm>
-            <a:off x="2667000" y="2590800"/>
+            <a:off x="1524000" y="3048000"/>
             <a:ext cx="914400" cy="276999"/>
           </a:xfrm>
           <a:prstGeom prst="rect">
@@ -3477,8 +3457,8 @@
           <a:lstStyle/>
           <a:p>
             <a:r>
-              <a:rPr lang="en-US" altLang="ko-KR" sz="1200" err="1" smtClean="0"/>
-              <a:t>ArVertex</a:t>
+              <a:rPr lang="en-US" altLang="ko-KR" sz="1200" smtClean="0"/>
+              <a:t>ArnVertex</a:t>
             </a:r>
             <a:endParaRPr lang="ko-KR" altLang="en-US" sz="1200"/>
           </a:p>
@@ -3492,7 +3472,7 @@
         </p:nvSpPr>
         <p:spPr>
           <a:xfrm>
-            <a:off x="2667000" y="3505200"/>
+            <a:off x="2667000" y="2590800"/>
             <a:ext cx="1066800" cy="276999"/>
           </a:xfrm>
           <a:prstGeom prst="rect">
@@ -3520,8 +3500,8 @@
           <a:lstStyle/>
           <a:p>
             <a:r>
-              <a:rPr lang="en-US" altLang="ko-KR" sz="1200" err="1" smtClean="0"/>
-              <a:t>ArAnimKey</a:t>
+              <a:rPr lang="en-US" altLang="ko-KR" sz="1200" smtClean="0"/>
+              <a:t>ArnAnimSeq</a:t>
             </a:r>
             <a:endParaRPr lang="ko-KR" altLang="en-US" sz="1200"/>
           </a:p>
@@ -3535,7 +3515,7 @@
         </p:nvSpPr>
         <p:spPr>
           <a:xfrm>
-            <a:off x="1447800" y="3962400"/>
+            <a:off x="1524000" y="3505200"/>
             <a:ext cx="1066800" cy="276999"/>
           </a:xfrm>
           <a:prstGeom prst="rect">
@@ -3564,7 +3544,7 @@
           <a:p>
             <a:r>
               <a:rPr lang="en-US" altLang="ko-KR" sz="1200" smtClean="0"/>
-              <a:t>ArPoint3</a:t>
+              <a:t>ArnPoint3</a:t>
             </a:r>
             <a:endParaRPr lang="ko-KR" altLang="en-US" sz="1200"/>
           </a:p>
@@ -3578,7 +3558,7 @@
         </p:nvSpPr>
         <p:spPr>
           <a:xfrm>
-            <a:off x="1447800" y="4419600"/>
+            <a:off x="1524000" y="3962400"/>
             <a:ext cx="1066800" cy="276999"/>
           </a:xfrm>
           <a:prstGeom prst="rect">
@@ -3607,7 +3587,7 @@
           <a:p>
             <a:r>
               <a:rPr lang="en-US" altLang="ko-KR" sz="1200" smtClean="0"/>
-              <a:t>ArMatrix4</a:t>
+              <a:t>ArnMatrix4</a:t>
             </a:r>
             <a:endParaRPr lang="ko-KR" altLang="en-US" sz="1200"/>
           </a:p>
@@ -3786,76 +3766,6 @@
       </p:cxnSp>
       <p:cxnSp>
         <p:nvCxnSpPr>
-          <p:cNvPr id="28" name="직선 연결선 27"/>
-          <p:cNvCxnSpPr>
-            <a:stCxn id="4" idx="3"/>
-            <a:endCxn id="12" idx="1"/>
-          </p:cNvCxnSpPr>
-          <p:nvPr/>
-        </p:nvCxnSpPr>
-        <p:spPr>
-          <a:xfrm>
-            <a:off x="2362200" y="900500"/>
-            <a:ext cx="304800" cy="1828800"/>
-          </a:xfrm>
-          <a:prstGeom prst="bentConnector3">
-            <a:avLst>
-              <a:gd name="adj1" fmla="val 50000"/>
-            </a:avLst>
-          </a:prstGeom>
-        </p:spPr>
-        <p:style>
-          <a:lnRef idx="2">
-            <a:schemeClr val="accent3"/>
-          </a:lnRef>
-          <a:fillRef idx="1">
-            <a:schemeClr val="lt1"/>
-          </a:fillRef>
-          <a:effectRef idx="0">
-            <a:schemeClr val="accent3"/>
-          </a:effectRef>
-          <a:fontRef idx="minor">
-            <a:schemeClr val="dk1"/>
-          </a:fontRef>
-        </p:style>
-      </p:cxnSp>
-      <p:cxnSp>
-        <p:nvCxnSpPr>
-          <p:cNvPr id="30" name="직선 연결선 29"/>
-          <p:cNvCxnSpPr>
-            <a:stCxn id="4" idx="3"/>
-            <a:endCxn id="9" idx="1"/>
-          </p:cNvCxnSpPr>
-          <p:nvPr/>
-        </p:nvCxnSpPr>
-        <p:spPr>
-          <a:xfrm>
-            <a:off x="2362200" y="900500"/>
-            <a:ext cx="304800" cy="2286000"/>
-          </a:xfrm>
-          <a:prstGeom prst="bentConnector3">
-            <a:avLst>
-              <a:gd name="adj1" fmla="val 50000"/>
-            </a:avLst>
-          </a:prstGeom>
-        </p:spPr>
-        <p:style>
-          <a:lnRef idx="2">
-            <a:schemeClr val="accent3"/>
-          </a:lnRef>
-          <a:fillRef idx="1">
-            <a:schemeClr val="lt1"/>
-          </a:fillRef>
-          <a:effectRef idx="0">
-            <a:schemeClr val="accent3"/>
-          </a:effectRef>
-          <a:fontRef idx="minor">
-            <a:schemeClr val="dk1"/>
-          </a:fontRef>
-        </p:style>
-      </p:cxnSp>
-      <p:cxnSp>
-        <p:nvCxnSpPr>
           <p:cNvPr id="32" name="직선 연결선 31"/>
           <p:cNvCxnSpPr>
             <a:stCxn id="4" idx="3"/>
@@ -3866,7 +3776,7 @@
         <p:spPr>
           <a:xfrm>
             <a:off x="2362200" y="900500"/>
-            <a:ext cx="304800" cy="2743200"/>
+            <a:ext cx="304800" cy="1828800"/>
           </a:xfrm>
           <a:prstGeom prst="bentConnector3">
             <a:avLst>
@@ -3899,13 +3809,13 @@
           <p:nvPr/>
         </p:nvCxnSpPr>
         <p:spPr>
-          <a:xfrm rot="10800000" flipV="1">
+          <a:xfrm rot="10800000" flipH="1" flipV="1">
             <a:off x="1447800" y="900500"/>
-            <a:ext cx="1588" cy="3200400"/>
+            <a:ext cx="76200" cy="2743200"/>
           </a:xfrm>
           <a:prstGeom prst="bentConnector3">
             <a:avLst>
-              <a:gd name="adj1" fmla="val 14395466"/>
+              <a:gd name="adj1" fmla="val -300000"/>
             </a:avLst>
           </a:prstGeom>
         </p:spPr>
@@ -3934,13 +3844,48 @@
           <p:nvPr/>
         </p:nvCxnSpPr>
         <p:spPr>
-          <a:xfrm rot="10800000" flipV="1">
+          <a:xfrm rot="10800000" flipH="1" flipV="1">
             <a:off x="1447800" y="900500"/>
-            <a:ext cx="1588" cy="3657600"/>
+            <a:ext cx="76200" cy="3200400"/>
           </a:xfrm>
           <a:prstGeom prst="bentConnector3">
             <a:avLst>
-              <a:gd name="adj1" fmla="val 14395466"/>
+              <a:gd name="adj1" fmla="val -300000"/>
+            </a:avLst>
+          </a:prstGeom>
+        </p:spPr>
+        <p:style>
+          <a:lnRef idx="2">
+            <a:schemeClr val="accent3"/>
+          </a:lnRef>
+          <a:fillRef idx="1">
+            <a:schemeClr val="lt1"/>
+          </a:fillRef>
+          <a:effectRef idx="0">
+            <a:schemeClr val="accent3"/>
+          </a:effectRef>
+          <a:fontRef idx="minor">
+            <a:schemeClr val="dk1"/>
+          </a:fontRef>
+        </p:style>
+      </p:cxnSp>
+      <p:cxnSp>
+        <p:nvCxnSpPr>
+          <p:cNvPr id="31" name="직선 연결선 30"/>
+          <p:cNvCxnSpPr>
+            <a:stCxn id="4" idx="1"/>
+            <a:endCxn id="12" idx="1"/>
+          </p:cNvCxnSpPr>
+          <p:nvPr/>
+        </p:nvCxnSpPr>
+        <p:spPr>
+          <a:xfrm rot="10800000" flipH="1" flipV="1">
+            <a:off x="1447800" y="900500"/>
+            <a:ext cx="76200" cy="2286000"/>
+          </a:xfrm>
+          <a:prstGeom prst="bentConnector3">
+            <a:avLst>
+              <a:gd name="adj1" fmla="val -300000"/>
             </a:avLst>
           </a:prstGeom>
         </p:spPr>

</xml_diff>